<commit_message>
Made some final changes
</commit_message>
<xml_diff>
--- a/Server_Architecture PPT.pptx
+++ b/Server_Architecture PPT.pptx
@@ -4,6 +4,9 @@
   <p:sldMasterIdLst>
     <p:sldMasterId id="2147483917" r:id="rId1"/>
   </p:sldMasterIdLst>
+  <p:notesMasterIdLst>
+    <p:notesMasterId r:id="rId12"/>
+  </p:notesMasterIdLst>
   <p:sldIdLst>
     <p:sldId id="256" r:id="rId2"/>
     <p:sldId id="265" r:id="rId3"/>
@@ -114,6 +117,440 @@
     </a:lvl9pPr>
   </p:defaultTextStyle>
 </p:presentation>
+</file>
+
+<file path=ppt/notesMasters/notesMaster1.xml><?xml version="1.0" encoding="utf-8"?>
+<p:notesMaster xmlns:a="http://schemas.openxmlformats.org/drawingml/2006/main" xmlns:r="http://schemas.openxmlformats.org/officeDocument/2006/relationships" xmlns:p="http://schemas.openxmlformats.org/presentationml/2006/main">
+  <p:cSld>
+    <p:bg>
+      <p:bgRef idx="1001">
+        <a:schemeClr val="bg1"/>
+      </p:bgRef>
+    </p:bg>
+    <p:spTree>
+      <p:nvGrpSpPr>
+        <p:cNvPr id="1" name=""/>
+        <p:cNvGrpSpPr/>
+        <p:nvPr/>
+      </p:nvGrpSpPr>
+      <p:grpSpPr>
+        <a:xfrm>
+          <a:off x="0" y="0"/>
+          <a:ext cx="0" cy="0"/>
+          <a:chOff x="0" y="0"/>
+          <a:chExt cx="0" cy="0"/>
+        </a:xfrm>
+      </p:grpSpPr>
+      <p:sp>
+        <p:nvSpPr>
+          <p:cNvPr id="2" name="Header Placeholder 1"/>
+          <p:cNvSpPr>
+            <a:spLocks noGrp="1"/>
+          </p:cNvSpPr>
+          <p:nvPr>
+            <p:ph type="hdr" sz="quarter"/>
+          </p:nvPr>
+        </p:nvSpPr>
+        <p:spPr>
+          <a:xfrm>
+            <a:off x="0" y="0"/>
+            <a:ext cx="2971800" cy="457200"/>
+          </a:xfrm>
+          <a:prstGeom prst="rect">
+            <a:avLst/>
+          </a:prstGeom>
+        </p:spPr>
+        <p:txBody>
+          <a:bodyPr vert="horz" lIns="91440" tIns="45720" rIns="91440" bIns="45720" rtlCol="0"/>
+          <a:lstStyle>
+            <a:lvl1pPr algn="l">
+              <a:defRPr sz="1200"/>
+            </a:lvl1pPr>
+          </a:lstStyle>
+          <a:p>
+            <a:endParaRPr lang="en-IN"/>
+          </a:p>
+        </p:txBody>
+      </p:sp>
+      <p:sp>
+        <p:nvSpPr>
+          <p:cNvPr id="3" name="Date Placeholder 2"/>
+          <p:cNvSpPr>
+            <a:spLocks noGrp="1"/>
+          </p:cNvSpPr>
+          <p:nvPr>
+            <p:ph type="dt" idx="1"/>
+          </p:nvPr>
+        </p:nvSpPr>
+        <p:spPr>
+          <a:xfrm>
+            <a:off x="3884613" y="0"/>
+            <a:ext cx="2971800" cy="457200"/>
+          </a:xfrm>
+          <a:prstGeom prst="rect">
+            <a:avLst/>
+          </a:prstGeom>
+        </p:spPr>
+        <p:txBody>
+          <a:bodyPr vert="horz" lIns="91440" tIns="45720" rIns="91440" bIns="45720" rtlCol="0"/>
+          <a:lstStyle>
+            <a:lvl1pPr algn="r">
+              <a:defRPr sz="1200"/>
+            </a:lvl1pPr>
+          </a:lstStyle>
+          <a:p>
+            <a:fld id="{956C5DC4-749D-4A67-868B-AA5BD811843D}" type="datetimeFigureOut">
+              <a:rPr lang="en-IN" smtClean="0"/>
+              <a:t>29-08-2019</a:t>
+            </a:fld>
+            <a:endParaRPr lang="en-IN"/>
+          </a:p>
+        </p:txBody>
+      </p:sp>
+      <p:sp>
+        <p:nvSpPr>
+          <p:cNvPr id="4" name="Slide Image Placeholder 3"/>
+          <p:cNvSpPr>
+            <a:spLocks noGrp="1" noRot="1" noChangeAspect="1"/>
+          </p:cNvSpPr>
+          <p:nvPr>
+            <p:ph type="sldImg" idx="2"/>
+          </p:nvPr>
+        </p:nvSpPr>
+        <p:spPr>
+          <a:xfrm>
+            <a:off x="381000" y="685800"/>
+            <a:ext cx="6096000" cy="3429000"/>
+          </a:xfrm>
+          <a:prstGeom prst="rect">
+            <a:avLst/>
+          </a:prstGeom>
+          <a:noFill/>
+          <a:ln w="12700">
+            <a:solidFill>
+              <a:prstClr val="black"/>
+            </a:solidFill>
+          </a:ln>
+        </p:spPr>
+        <p:txBody>
+          <a:bodyPr vert="horz" lIns="91440" tIns="45720" rIns="91440" bIns="45720" rtlCol="0" anchor="ctr"/>
+          <a:lstStyle/>
+          <a:p>
+            <a:endParaRPr lang="en-IN"/>
+          </a:p>
+        </p:txBody>
+      </p:sp>
+      <p:sp>
+        <p:nvSpPr>
+          <p:cNvPr id="5" name="Notes Placeholder 4"/>
+          <p:cNvSpPr>
+            <a:spLocks noGrp="1"/>
+          </p:cNvSpPr>
+          <p:nvPr>
+            <p:ph type="body" sz="quarter" idx="3"/>
+          </p:nvPr>
+        </p:nvSpPr>
+        <p:spPr>
+          <a:xfrm>
+            <a:off x="685800" y="4343400"/>
+            <a:ext cx="5486400" cy="4114800"/>
+          </a:xfrm>
+          <a:prstGeom prst="rect">
+            <a:avLst/>
+          </a:prstGeom>
+        </p:spPr>
+        <p:txBody>
+          <a:bodyPr vert="horz" lIns="91440" tIns="45720" rIns="91440" bIns="45720" rtlCol="0"/>
+          <a:lstStyle/>
+          <a:p>
+            <a:pPr lvl="0"/>
+            <a:r>
+              <a:rPr lang="en-US" smtClean="0"/>
+              <a:t>Click to edit Master text styles</a:t>
+            </a:r>
+          </a:p>
+          <a:p>
+            <a:pPr lvl="1"/>
+            <a:r>
+              <a:rPr lang="en-US" smtClean="0"/>
+              <a:t>Second level</a:t>
+            </a:r>
+          </a:p>
+          <a:p>
+            <a:pPr lvl="2"/>
+            <a:r>
+              <a:rPr lang="en-US" smtClean="0"/>
+              <a:t>Third level</a:t>
+            </a:r>
+          </a:p>
+          <a:p>
+            <a:pPr lvl="3"/>
+            <a:r>
+              <a:rPr lang="en-US" smtClean="0"/>
+              <a:t>Fourth level</a:t>
+            </a:r>
+          </a:p>
+          <a:p>
+            <a:pPr lvl="4"/>
+            <a:r>
+              <a:rPr lang="en-US" smtClean="0"/>
+              <a:t>Fifth level</a:t>
+            </a:r>
+            <a:endParaRPr lang="en-IN"/>
+          </a:p>
+        </p:txBody>
+      </p:sp>
+      <p:sp>
+        <p:nvSpPr>
+          <p:cNvPr id="6" name="Footer Placeholder 5"/>
+          <p:cNvSpPr>
+            <a:spLocks noGrp="1"/>
+          </p:cNvSpPr>
+          <p:nvPr>
+            <p:ph type="ftr" sz="quarter" idx="4"/>
+          </p:nvPr>
+        </p:nvSpPr>
+        <p:spPr>
+          <a:xfrm>
+            <a:off x="0" y="8685213"/>
+            <a:ext cx="2971800" cy="457200"/>
+          </a:xfrm>
+          <a:prstGeom prst="rect">
+            <a:avLst/>
+          </a:prstGeom>
+        </p:spPr>
+        <p:txBody>
+          <a:bodyPr vert="horz" lIns="91440" tIns="45720" rIns="91440" bIns="45720" rtlCol="0" anchor="b"/>
+          <a:lstStyle>
+            <a:lvl1pPr algn="l">
+              <a:defRPr sz="1200"/>
+            </a:lvl1pPr>
+          </a:lstStyle>
+          <a:p>
+            <a:endParaRPr lang="en-IN"/>
+          </a:p>
+        </p:txBody>
+      </p:sp>
+      <p:sp>
+        <p:nvSpPr>
+          <p:cNvPr id="7" name="Slide Number Placeholder 6"/>
+          <p:cNvSpPr>
+            <a:spLocks noGrp="1"/>
+          </p:cNvSpPr>
+          <p:nvPr>
+            <p:ph type="sldNum" sz="quarter" idx="5"/>
+          </p:nvPr>
+        </p:nvSpPr>
+        <p:spPr>
+          <a:xfrm>
+            <a:off x="3884613" y="8685213"/>
+            <a:ext cx="2971800" cy="457200"/>
+          </a:xfrm>
+          <a:prstGeom prst="rect">
+            <a:avLst/>
+          </a:prstGeom>
+        </p:spPr>
+        <p:txBody>
+          <a:bodyPr vert="horz" lIns="91440" tIns="45720" rIns="91440" bIns="45720" rtlCol="0" anchor="b"/>
+          <a:lstStyle>
+            <a:lvl1pPr algn="r">
+              <a:defRPr sz="1200"/>
+            </a:lvl1pPr>
+          </a:lstStyle>
+          <a:p>
+            <a:fld id="{B5640893-F135-4B51-94B1-27DABB6F06E8}" type="slidenum">
+              <a:rPr lang="en-IN" smtClean="0"/>
+              <a:t>‹#›</a:t>
+            </a:fld>
+            <a:endParaRPr lang="en-IN"/>
+          </a:p>
+        </p:txBody>
+      </p:sp>
+    </p:spTree>
+    <p:extLst>
+      <p:ext uri="{BB962C8B-B14F-4D97-AF65-F5344CB8AC3E}">
+        <p14:creationId xmlns:p14="http://schemas.microsoft.com/office/powerpoint/2010/main" val="1662535297"/>
+      </p:ext>
+    </p:extLst>
+  </p:cSld>
+  <p:clrMap bg1="lt1" tx1="dk1" bg2="lt2" tx2="dk2" accent1="accent1" accent2="accent2" accent3="accent3" accent4="accent4" accent5="accent5" accent6="accent6" hlink="hlink" folHlink="folHlink"/>
+  <p:notesStyle>
+    <a:lvl1pPr marL="0" algn="l" defTabSz="914400" rtl="0" eaLnBrk="1" latinLnBrk="0" hangingPunct="1">
+      <a:defRPr sz="1200" kern="1200">
+        <a:solidFill>
+          <a:schemeClr val="tx1"/>
+        </a:solidFill>
+        <a:latin typeface="+mn-lt"/>
+        <a:ea typeface="+mn-ea"/>
+        <a:cs typeface="+mn-cs"/>
+      </a:defRPr>
+    </a:lvl1pPr>
+    <a:lvl2pPr marL="457200" algn="l" defTabSz="914400" rtl="0" eaLnBrk="1" latinLnBrk="0" hangingPunct="1">
+      <a:defRPr sz="1200" kern="1200">
+        <a:solidFill>
+          <a:schemeClr val="tx1"/>
+        </a:solidFill>
+        <a:latin typeface="+mn-lt"/>
+        <a:ea typeface="+mn-ea"/>
+        <a:cs typeface="+mn-cs"/>
+      </a:defRPr>
+    </a:lvl2pPr>
+    <a:lvl3pPr marL="914400" algn="l" defTabSz="914400" rtl="0" eaLnBrk="1" latinLnBrk="0" hangingPunct="1">
+      <a:defRPr sz="1200" kern="1200">
+        <a:solidFill>
+          <a:schemeClr val="tx1"/>
+        </a:solidFill>
+        <a:latin typeface="+mn-lt"/>
+        <a:ea typeface="+mn-ea"/>
+        <a:cs typeface="+mn-cs"/>
+      </a:defRPr>
+    </a:lvl3pPr>
+    <a:lvl4pPr marL="1371600" algn="l" defTabSz="914400" rtl="0" eaLnBrk="1" latinLnBrk="0" hangingPunct="1">
+      <a:defRPr sz="1200" kern="1200">
+        <a:solidFill>
+          <a:schemeClr val="tx1"/>
+        </a:solidFill>
+        <a:latin typeface="+mn-lt"/>
+        <a:ea typeface="+mn-ea"/>
+        <a:cs typeface="+mn-cs"/>
+      </a:defRPr>
+    </a:lvl4pPr>
+    <a:lvl5pPr marL="1828800" algn="l" defTabSz="914400" rtl="0" eaLnBrk="1" latinLnBrk="0" hangingPunct="1">
+      <a:defRPr sz="1200" kern="1200">
+        <a:solidFill>
+          <a:schemeClr val="tx1"/>
+        </a:solidFill>
+        <a:latin typeface="+mn-lt"/>
+        <a:ea typeface="+mn-ea"/>
+        <a:cs typeface="+mn-cs"/>
+      </a:defRPr>
+    </a:lvl5pPr>
+    <a:lvl6pPr marL="2286000" algn="l" defTabSz="914400" rtl="0" eaLnBrk="1" latinLnBrk="0" hangingPunct="1">
+      <a:defRPr sz="1200" kern="1200">
+        <a:solidFill>
+          <a:schemeClr val="tx1"/>
+        </a:solidFill>
+        <a:latin typeface="+mn-lt"/>
+        <a:ea typeface="+mn-ea"/>
+        <a:cs typeface="+mn-cs"/>
+      </a:defRPr>
+    </a:lvl6pPr>
+    <a:lvl7pPr marL="2743200" algn="l" defTabSz="914400" rtl="0" eaLnBrk="1" latinLnBrk="0" hangingPunct="1">
+      <a:defRPr sz="1200" kern="1200">
+        <a:solidFill>
+          <a:schemeClr val="tx1"/>
+        </a:solidFill>
+        <a:latin typeface="+mn-lt"/>
+        <a:ea typeface="+mn-ea"/>
+        <a:cs typeface="+mn-cs"/>
+      </a:defRPr>
+    </a:lvl7pPr>
+    <a:lvl8pPr marL="3200400" algn="l" defTabSz="914400" rtl="0" eaLnBrk="1" latinLnBrk="0" hangingPunct="1">
+      <a:defRPr sz="1200" kern="1200">
+        <a:solidFill>
+          <a:schemeClr val="tx1"/>
+        </a:solidFill>
+        <a:latin typeface="+mn-lt"/>
+        <a:ea typeface="+mn-ea"/>
+        <a:cs typeface="+mn-cs"/>
+      </a:defRPr>
+    </a:lvl8pPr>
+    <a:lvl9pPr marL="3657600" algn="l" defTabSz="914400" rtl="0" eaLnBrk="1" latinLnBrk="0" hangingPunct="1">
+      <a:defRPr sz="1200" kern="1200">
+        <a:solidFill>
+          <a:schemeClr val="tx1"/>
+        </a:solidFill>
+        <a:latin typeface="+mn-lt"/>
+        <a:ea typeface="+mn-ea"/>
+        <a:cs typeface="+mn-cs"/>
+      </a:defRPr>
+    </a:lvl9pPr>
+  </p:notesStyle>
+</p:notesMaster>
+</file>
+
+<file path=ppt/notesSlides/notesSlide1.xml><?xml version="1.0" encoding="utf-8"?>
+<p:notes xmlns:a="http://schemas.openxmlformats.org/drawingml/2006/main" xmlns:r="http://schemas.openxmlformats.org/officeDocument/2006/relationships" xmlns:p="http://schemas.openxmlformats.org/presentationml/2006/main">
+  <p:cSld>
+    <p:spTree>
+      <p:nvGrpSpPr>
+        <p:cNvPr id="1" name=""/>
+        <p:cNvGrpSpPr/>
+        <p:nvPr/>
+      </p:nvGrpSpPr>
+      <p:grpSpPr>
+        <a:xfrm>
+          <a:off x="0" y="0"/>
+          <a:ext cx="0" cy="0"/>
+          <a:chOff x="0" y="0"/>
+          <a:chExt cx="0" cy="0"/>
+        </a:xfrm>
+      </p:grpSpPr>
+      <p:sp>
+        <p:nvSpPr>
+          <p:cNvPr id="2" name="Slide Image Placeholder 1"/>
+          <p:cNvSpPr>
+            <a:spLocks noGrp="1" noRot="1" noChangeAspect="1"/>
+          </p:cNvSpPr>
+          <p:nvPr>
+            <p:ph type="sldImg"/>
+          </p:nvPr>
+        </p:nvSpPr>
+        <p:spPr/>
+      </p:sp>
+      <p:sp>
+        <p:nvSpPr>
+          <p:cNvPr id="3" name="Notes Placeholder 2"/>
+          <p:cNvSpPr>
+            <a:spLocks noGrp="1"/>
+          </p:cNvSpPr>
+          <p:nvPr>
+            <p:ph type="body" idx="1"/>
+          </p:nvPr>
+        </p:nvSpPr>
+        <p:spPr/>
+        <p:txBody>
+          <a:bodyPr/>
+          <a:lstStyle/>
+          <a:p>
+            <a:endParaRPr lang="en-IN" dirty="0"/>
+          </a:p>
+        </p:txBody>
+      </p:sp>
+      <p:sp>
+        <p:nvSpPr>
+          <p:cNvPr id="4" name="Slide Number Placeholder 3"/>
+          <p:cNvSpPr>
+            <a:spLocks noGrp="1"/>
+          </p:cNvSpPr>
+          <p:nvPr>
+            <p:ph type="sldNum" sz="quarter" idx="10"/>
+          </p:nvPr>
+        </p:nvSpPr>
+        <p:spPr/>
+        <p:txBody>
+          <a:bodyPr/>
+          <a:lstStyle/>
+          <a:p>
+            <a:fld id="{B5640893-F135-4B51-94B1-27DABB6F06E8}" type="slidenum">
+              <a:rPr lang="en-IN" smtClean="0"/>
+              <a:t>1</a:t>
+            </a:fld>
+            <a:endParaRPr lang="en-IN"/>
+          </a:p>
+        </p:txBody>
+      </p:sp>
+    </p:spTree>
+    <p:extLst>
+      <p:ext uri="{BB962C8B-B14F-4D97-AF65-F5344CB8AC3E}">
+        <p14:creationId xmlns:p14="http://schemas.microsoft.com/office/powerpoint/2010/main" val="1598412740"/>
+      </p:ext>
+    </p:extLst>
+  </p:cSld>
+  <p:clrMapOvr>
+    <a:masterClrMapping/>
+  </p:clrMapOvr>
+</p:notes>
 </file>
 
 <file path=ppt/slideLayouts/slideLayout1.xml><?xml version="1.0" encoding="utf-8"?>
@@ -3637,7 +4074,7 @@
           <p:cNvPr id="4" name="Rectangle 2">
             <a:extLst>
               <a:ext uri="{FF2B5EF4-FFF2-40B4-BE49-F238E27FC236}">
-                <a16:creationId xmlns:a16="http://schemas.microsoft.com/office/drawing/2014/main" id="{C62C8433-4255-4DF9-A582-EA9B56F9B566}"/>
+                <a16:creationId xmlns:a16="http://schemas.microsoft.com/office/drawing/2014/main" xmlns="" id="{C62C8433-4255-4DF9-A582-EA9B56F9B566}"/>
               </a:ext>
             </a:extLst>
           </p:cNvPr>
@@ -3706,7 +4143,7 @@
           <p:cNvPr id="1025" name="Picture 58">
             <a:extLst>
               <a:ext uri="{FF2B5EF4-FFF2-40B4-BE49-F238E27FC236}">
-                <a16:creationId xmlns:a16="http://schemas.microsoft.com/office/drawing/2014/main" id="{9530527C-3B12-4C8B-9C34-285F01F2874F}"/>
+                <a16:creationId xmlns:a16="http://schemas.microsoft.com/office/drawing/2014/main" xmlns="" id="{9530527C-3B12-4C8B-9C34-285F01F2874F}"/>
               </a:ext>
             </a:extLst>
           </p:cNvPr>
@@ -3716,7 +4153,7 @@
           <p:nvPr/>
         </p:nvPicPr>
         <p:blipFill>
-          <a:blip r:embed="rId2">
+          <a:blip r:embed="rId3" cstate="print">
             <a:extLst>
               <a:ext uri="{28A0092B-C50C-407E-A947-70E740481C1C}">
                 <a14:useLocalDpi xmlns:a14="http://schemas.microsoft.com/office/drawing/2010/main" val="0"/>
@@ -3753,7 +4190,7 @@
           <p:cNvPr id="5" name="Rectangle 3">
             <a:extLst>
               <a:ext uri="{FF2B5EF4-FFF2-40B4-BE49-F238E27FC236}">
-                <a16:creationId xmlns:a16="http://schemas.microsoft.com/office/drawing/2014/main" id="{7112B42E-84F6-45EB-96CA-460A1791B68F}"/>
+                <a16:creationId xmlns:a16="http://schemas.microsoft.com/office/drawing/2014/main" xmlns="" id="{7112B42E-84F6-45EB-96CA-460A1791B68F}"/>
               </a:ext>
             </a:extLst>
           </p:cNvPr>
@@ -3995,7 +4432,7 @@
           <p:cNvPr id="6" name="TextBox 5">
             <a:extLst>
               <a:ext uri="{FF2B5EF4-FFF2-40B4-BE49-F238E27FC236}">
-                <a16:creationId xmlns:a16="http://schemas.microsoft.com/office/drawing/2014/main" id="{AD270AC7-945F-4F1F-B4FB-29CBEFF4220B}"/>
+                <a16:creationId xmlns:a16="http://schemas.microsoft.com/office/drawing/2014/main" xmlns="" id="{AD270AC7-945F-4F1F-B4FB-29CBEFF4220B}"/>
               </a:ext>
             </a:extLst>
           </p:cNvPr>
@@ -4061,7 +4498,7 @@
           <p:cNvPr id="2" name="Title 1">
             <a:extLst>
               <a:ext uri="{FF2B5EF4-FFF2-40B4-BE49-F238E27FC236}">
-                <a16:creationId xmlns:a16="http://schemas.microsoft.com/office/drawing/2014/main" id="{13AA3579-19D9-4098-9D3D-16FF14F670DA}"/>
+                <a16:creationId xmlns:a16="http://schemas.microsoft.com/office/drawing/2014/main" xmlns="" id="{13AA3579-19D9-4098-9D3D-16FF14F670DA}"/>
               </a:ext>
             </a:extLst>
           </p:cNvPr>
@@ -4092,41 +4529,6 @@
               <a:rPr lang="en-GB" sz="2800" dirty="0"/>
               <a:t>for precious time …</a:t>
             </a:r>
-            <a:endParaRPr lang="en-IN" dirty="0"/>
-          </a:p>
-        </p:txBody>
-      </p:sp>
-      <p:sp>
-        <p:nvSpPr>
-          <p:cNvPr id="3" name="Content Placeholder 2">
-            <a:extLst>
-              <a:ext uri="{FF2B5EF4-FFF2-40B4-BE49-F238E27FC236}">
-                <a16:creationId xmlns:a16="http://schemas.microsoft.com/office/drawing/2014/main" id="{93A53EF8-060A-4F9C-9A9C-C0911D3789E6}"/>
-              </a:ext>
-            </a:extLst>
-          </p:cNvPr>
-          <p:cNvSpPr>
-            <a:spLocks noGrp="1"/>
-          </p:cNvSpPr>
-          <p:nvPr>
-            <p:ph sz="quarter" idx="13"/>
-          </p:nvPr>
-        </p:nvSpPr>
-        <p:spPr>
-          <a:xfrm>
-            <a:off x="-487908" y="4605535"/>
-            <a:ext cx="45719" cy="45719"/>
-          </a:xfrm>
-        </p:spPr>
-        <p:txBody>
-          <a:bodyPr>
-            <a:normAutofit fontScale="25000" lnSpcReduction="20000"/>
-          </a:bodyPr>
-          <a:lstStyle/>
-          <a:p>
-            <a:pPr marL="0" indent="0">
-              <a:buNone/>
-            </a:pPr>
             <a:endParaRPr lang="en-IN" dirty="0"/>
           </a:p>
         </p:txBody>
@@ -4166,7 +4568,7 @@
           <p:cNvPr id="2" name="Title 1">
             <a:extLst>
               <a:ext uri="{FF2B5EF4-FFF2-40B4-BE49-F238E27FC236}">
-                <a16:creationId xmlns:a16="http://schemas.microsoft.com/office/drawing/2014/main" id="{22385106-EB39-4760-A78E-9B2C2D0BDB15}"/>
+                <a16:creationId xmlns:a16="http://schemas.microsoft.com/office/drawing/2014/main" xmlns="" id="{22385106-EB39-4760-A78E-9B2C2D0BDB15}"/>
               </a:ext>
             </a:extLst>
           </p:cNvPr>
@@ -4202,7 +4604,7 @@
           <p:cNvPr id="4" name="TextBox 3">
             <a:extLst>
               <a:ext uri="{FF2B5EF4-FFF2-40B4-BE49-F238E27FC236}">
-                <a16:creationId xmlns:a16="http://schemas.microsoft.com/office/drawing/2014/main" id="{259C0A27-4D15-4D14-9A51-EA266A5EF74A}"/>
+                <a16:creationId xmlns:a16="http://schemas.microsoft.com/office/drawing/2014/main" xmlns="" id="{259C0A27-4D15-4D14-9A51-EA266A5EF74A}"/>
               </a:ext>
             </a:extLst>
           </p:cNvPr>
@@ -4288,7 +4690,7 @@
           <p:cNvPr id="2" name="Title 1">
             <a:extLst>
               <a:ext uri="{FF2B5EF4-FFF2-40B4-BE49-F238E27FC236}">
-                <a16:creationId xmlns:a16="http://schemas.microsoft.com/office/drawing/2014/main" id="{ACB9C629-D534-4E0B-9E49-E69AD0A8AAE2}"/>
+                <a16:creationId xmlns:a16="http://schemas.microsoft.com/office/drawing/2014/main" xmlns="" id="{ACB9C629-D534-4E0B-9E49-E69AD0A8AAE2}"/>
               </a:ext>
             </a:extLst>
           </p:cNvPr>
@@ -4324,7 +4726,7 @@
           <p:cNvPr id="3" name="Content Placeholder 2">
             <a:extLst>
               <a:ext uri="{FF2B5EF4-FFF2-40B4-BE49-F238E27FC236}">
-                <a16:creationId xmlns:a16="http://schemas.microsoft.com/office/drawing/2014/main" id="{E0719E46-645D-4D68-8C2F-C49F6782B359}"/>
+                <a16:creationId xmlns:a16="http://schemas.microsoft.com/office/drawing/2014/main" xmlns="" id="{E0719E46-645D-4D68-8C2F-C49F6782B359}"/>
               </a:ext>
             </a:extLst>
           </p:cNvPr>
@@ -4496,7 +4898,7 @@
           <p:cNvPr id="2" name="Title 1">
             <a:extLst>
               <a:ext uri="{FF2B5EF4-FFF2-40B4-BE49-F238E27FC236}">
-                <a16:creationId xmlns:a16="http://schemas.microsoft.com/office/drawing/2014/main" id="{1D0EFF4E-36D7-40FC-9FE4-E55EE42C8EE4}"/>
+                <a16:creationId xmlns:a16="http://schemas.microsoft.com/office/drawing/2014/main" xmlns="" id="{1D0EFF4E-36D7-40FC-9FE4-E55EE42C8EE4}"/>
               </a:ext>
             </a:extLst>
           </p:cNvPr>
@@ -4525,7 +4927,7 @@
           <p:cNvPr id="3" name="Content Placeholder 2">
             <a:extLst>
               <a:ext uri="{FF2B5EF4-FFF2-40B4-BE49-F238E27FC236}">
-                <a16:creationId xmlns:a16="http://schemas.microsoft.com/office/drawing/2014/main" id="{8D89595D-010C-4FF6-8D32-42DB9E5C6444}"/>
+                <a16:creationId xmlns:a16="http://schemas.microsoft.com/office/drawing/2014/main" xmlns="" id="{8D89595D-010C-4FF6-8D32-42DB9E5C6444}"/>
               </a:ext>
             </a:extLst>
           </p:cNvPr>
@@ -4657,7 +5059,7 @@
           <p:cNvPr id="2" name="Title 1">
             <a:extLst>
               <a:ext uri="{FF2B5EF4-FFF2-40B4-BE49-F238E27FC236}">
-                <a16:creationId xmlns:a16="http://schemas.microsoft.com/office/drawing/2014/main" id="{FD264866-3278-47CD-91FE-D942D8FD57FA}"/>
+                <a16:creationId xmlns:a16="http://schemas.microsoft.com/office/drawing/2014/main" xmlns="" id="{FD264866-3278-47CD-91FE-D942D8FD57FA}"/>
               </a:ext>
             </a:extLst>
           </p:cNvPr>
@@ -4691,7 +5093,7 @@
           <p:cNvPr id="3" name="Content Placeholder 2">
             <a:extLst>
               <a:ext uri="{FF2B5EF4-FFF2-40B4-BE49-F238E27FC236}">
-                <a16:creationId xmlns:a16="http://schemas.microsoft.com/office/drawing/2014/main" id="{F240150C-30A2-4493-AD54-B9A7F111862B}"/>
+                <a16:creationId xmlns:a16="http://schemas.microsoft.com/office/drawing/2014/main" xmlns="" id="{F240150C-30A2-4493-AD54-B9A7F111862B}"/>
               </a:ext>
             </a:extLst>
           </p:cNvPr>
@@ -4728,7 +5130,7 @@
           <p:cNvPr id="5" name="Picture 4">
             <a:extLst>
               <a:ext uri="{FF2B5EF4-FFF2-40B4-BE49-F238E27FC236}">
-                <a16:creationId xmlns:a16="http://schemas.microsoft.com/office/drawing/2014/main" id="{BEF8D6EC-3A57-481F-A825-CD10FD8836E4}"/>
+                <a16:creationId xmlns:a16="http://schemas.microsoft.com/office/drawing/2014/main" xmlns="" id="{BEF8D6EC-3A57-481F-A825-CD10FD8836E4}"/>
               </a:ext>
             </a:extLst>
           </p:cNvPr>
@@ -4794,7 +5196,7 @@
           <p:cNvPr id="2" name="Title 1">
             <a:extLst>
               <a:ext uri="{FF2B5EF4-FFF2-40B4-BE49-F238E27FC236}">
-                <a16:creationId xmlns:a16="http://schemas.microsoft.com/office/drawing/2014/main" id="{7E1D035E-4032-423C-9596-F701E2AAF94A}"/>
+                <a16:creationId xmlns:a16="http://schemas.microsoft.com/office/drawing/2014/main" xmlns="" id="{7E1D035E-4032-423C-9596-F701E2AAF94A}"/>
               </a:ext>
             </a:extLst>
           </p:cNvPr>
@@ -4826,7 +5228,7 @@
           <p:cNvPr id="3" name="Content Placeholder 2">
             <a:extLst>
               <a:ext uri="{FF2B5EF4-FFF2-40B4-BE49-F238E27FC236}">
-                <a16:creationId xmlns:a16="http://schemas.microsoft.com/office/drawing/2014/main" id="{C011688A-F81E-42BE-9F17-C1FBF803FF5F}"/>
+                <a16:creationId xmlns:a16="http://schemas.microsoft.com/office/drawing/2014/main" xmlns="" id="{C011688A-F81E-42BE-9F17-C1FBF803FF5F}"/>
               </a:ext>
             </a:extLst>
           </p:cNvPr>
@@ -4937,7 +5339,7 @@
           <p:cNvPr id="2" name="Title 1">
             <a:extLst>
               <a:ext uri="{FF2B5EF4-FFF2-40B4-BE49-F238E27FC236}">
-                <a16:creationId xmlns:a16="http://schemas.microsoft.com/office/drawing/2014/main" id="{4E4FC654-84A9-4FFA-BF47-339376D1DA49}"/>
+                <a16:creationId xmlns:a16="http://schemas.microsoft.com/office/drawing/2014/main" xmlns="" id="{4E4FC654-84A9-4FFA-BF47-339376D1DA49}"/>
               </a:ext>
             </a:extLst>
           </p:cNvPr>
@@ -4973,7 +5375,7 @@
           <p:cNvPr id="3" name="Content Placeholder 2">
             <a:extLst>
               <a:ext uri="{FF2B5EF4-FFF2-40B4-BE49-F238E27FC236}">
-                <a16:creationId xmlns:a16="http://schemas.microsoft.com/office/drawing/2014/main" id="{8CE72870-D5A1-4F1E-A5EB-65CC8BF3493B}"/>
+                <a16:creationId xmlns:a16="http://schemas.microsoft.com/office/drawing/2014/main" xmlns="" id="{8CE72870-D5A1-4F1E-A5EB-65CC8BF3493B}"/>
               </a:ext>
             </a:extLst>
           </p:cNvPr>
@@ -5093,7 +5495,7 @@
           <p:cNvPr id="2" name="Title 1">
             <a:extLst>
               <a:ext uri="{FF2B5EF4-FFF2-40B4-BE49-F238E27FC236}">
-                <a16:creationId xmlns:a16="http://schemas.microsoft.com/office/drawing/2014/main" id="{5FAC82F6-A9AA-402D-8CD3-8B951453B760}"/>
+                <a16:creationId xmlns:a16="http://schemas.microsoft.com/office/drawing/2014/main" xmlns="" id="{5FAC82F6-A9AA-402D-8CD3-8B951453B760}"/>
               </a:ext>
             </a:extLst>
           </p:cNvPr>
@@ -5122,7 +5524,7 @@
           <p:cNvPr id="3" name="Content Placeholder 2">
             <a:extLst>
               <a:ext uri="{FF2B5EF4-FFF2-40B4-BE49-F238E27FC236}">
-                <a16:creationId xmlns:a16="http://schemas.microsoft.com/office/drawing/2014/main" id="{33B55CFC-2DDD-4E4B-8386-B7346E57A5F1}"/>
+                <a16:creationId xmlns:a16="http://schemas.microsoft.com/office/drawing/2014/main" xmlns="" id="{33B55CFC-2DDD-4E4B-8386-B7346E57A5F1}"/>
               </a:ext>
             </a:extLst>
           </p:cNvPr>
@@ -5256,7 +5658,7 @@
           <p:cNvPr id="2" name="Title 1">
             <a:extLst>
               <a:ext uri="{FF2B5EF4-FFF2-40B4-BE49-F238E27FC236}">
-                <a16:creationId xmlns:a16="http://schemas.microsoft.com/office/drawing/2014/main" id="{02357D58-AA01-447F-BAAB-E77B821A9C94}"/>
+                <a16:creationId xmlns:a16="http://schemas.microsoft.com/office/drawing/2014/main" xmlns="" id="{02357D58-AA01-447F-BAAB-E77B821A9C94}"/>
               </a:ext>
             </a:extLst>
           </p:cNvPr>
@@ -5296,7 +5698,7 @@
           <p:cNvPr id="4" name="Content Placeholder 3">
             <a:extLst>
               <a:ext uri="{FF2B5EF4-FFF2-40B4-BE49-F238E27FC236}">
-                <a16:creationId xmlns:a16="http://schemas.microsoft.com/office/drawing/2014/main" id="{C87DD56F-A8E8-42D0-A791-C6D227D174CE}"/>
+                <a16:creationId xmlns:a16="http://schemas.microsoft.com/office/drawing/2014/main" xmlns="" id="{C87DD56F-A8E8-42D0-A791-C6D227D174CE}"/>
               </a:ext>
             </a:extLst>
           </p:cNvPr>
@@ -5388,7 +5790,7 @@
     </a:clrScheme>
     <a:fontScheme name="View">
       <a:majorFont>
-        <a:latin typeface="Century Schoolbook" panose="02040604050505020304"/>
+        <a:latin typeface="Century Schoolbook"/>
         <a:ea typeface=""/>
         <a:cs typeface=""/>
         <a:font script="Jpan" typeface="ＭＳ ゴシック"/>
@@ -5423,7 +5825,7 @@
         <a:font script="Geor" typeface="Sylfaen"/>
       </a:majorFont>
       <a:minorFont>
-        <a:latin typeface="Century Schoolbook" panose="02040604050505020304"/>
+        <a:latin typeface="Century Schoolbook"/>
         <a:ea typeface=""/>
         <a:cs typeface=""/>
         <a:font script="Jpan" typeface="ＭＳ ゴシック"/>
@@ -5592,8 +5994,293 @@
   <a:extraClrSchemeLst/>
   <a:extLst>
     <a:ext uri="{05A4C25C-085E-4340-85A3-A5531E510DB2}">
-      <thm15:themeFamily xmlns:thm15="http://schemas.microsoft.com/office/thememl/2012/main" name="View" id="{BA0EB5A6-F2D4-4F82-977B-64ADEE4A2A69}" vid="{3969A8A2-35DB-4E3B-8885-16FD20568674}"/>
+      <thm15:themeFamily xmlns:thm15="http://schemas.microsoft.com/office/thememl/2012/main" xmlns="" name="View" id="{BA0EB5A6-F2D4-4F82-977B-64ADEE4A2A69}" vid="{3969A8A2-35DB-4E3B-8885-16FD20568674}"/>
     </a:ext>
   </a:extLst>
 </a:theme>
+</file>
+
+<file path=ppt/theme/theme2.xml><?xml version="1.0" encoding="utf-8"?>
+<a:theme xmlns:a="http://schemas.openxmlformats.org/drawingml/2006/main" name="Office Theme">
+  <a:themeElements>
+    <a:clrScheme name="Office">
+      <a:dk1>
+        <a:sysClr val="windowText" lastClr="000000"/>
+      </a:dk1>
+      <a:lt1>
+        <a:sysClr val="window" lastClr="FFFFFF"/>
+      </a:lt1>
+      <a:dk2>
+        <a:srgbClr val="1F497D"/>
+      </a:dk2>
+      <a:lt2>
+        <a:srgbClr val="EEECE1"/>
+      </a:lt2>
+      <a:accent1>
+        <a:srgbClr val="4F81BD"/>
+      </a:accent1>
+      <a:accent2>
+        <a:srgbClr val="C0504D"/>
+      </a:accent2>
+      <a:accent3>
+        <a:srgbClr val="9BBB59"/>
+      </a:accent3>
+      <a:accent4>
+        <a:srgbClr val="8064A2"/>
+      </a:accent4>
+      <a:accent5>
+        <a:srgbClr val="4BACC6"/>
+      </a:accent5>
+      <a:accent6>
+        <a:srgbClr val="F79646"/>
+      </a:accent6>
+      <a:hlink>
+        <a:srgbClr val="0000FF"/>
+      </a:hlink>
+      <a:folHlink>
+        <a:srgbClr val="800080"/>
+      </a:folHlink>
+    </a:clrScheme>
+    <a:fontScheme name="Office">
+      <a:majorFont>
+        <a:latin typeface="Calibri"/>
+        <a:ea typeface=""/>
+        <a:cs typeface=""/>
+        <a:font script="Jpan" typeface="ＭＳ Ｐゴシック"/>
+        <a:font script="Hang" typeface="맑은 고딕"/>
+        <a:font script="Hans" typeface="宋体"/>
+        <a:font script="Hant" typeface="新細明體"/>
+        <a:font script="Arab" typeface="Times New Roman"/>
+        <a:font script="Hebr" typeface="Times New Roman"/>
+        <a:font script="Thai" typeface="Angsana New"/>
+        <a:font script="Ethi" typeface="Nyala"/>
+        <a:font script="Beng" typeface="Vrinda"/>
+        <a:font script="Gujr" typeface="Shruti"/>
+        <a:font script="Khmr" typeface="MoolBoran"/>
+        <a:font script="Knda" typeface="Tunga"/>
+        <a:font script="Guru" typeface="Raavi"/>
+        <a:font script="Cans" typeface="Euphemia"/>
+        <a:font script="Cher" typeface="Plantagenet Cherokee"/>
+        <a:font script="Yiii" typeface="Microsoft Yi Baiti"/>
+        <a:font script="Tibt" typeface="Microsoft Himalaya"/>
+        <a:font script="Thaa" typeface="MV Boli"/>
+        <a:font script="Deva" typeface="Mangal"/>
+        <a:font script="Telu" typeface="Gautami"/>
+        <a:font script="Taml" typeface="Latha"/>
+        <a:font script="Syrc" typeface="Estrangelo Edessa"/>
+        <a:font script="Orya" typeface="Kalinga"/>
+        <a:font script="Mlym" typeface="Kartika"/>
+        <a:font script="Laoo" typeface="DokChampa"/>
+        <a:font script="Sinh" typeface="Iskoola Pota"/>
+        <a:font script="Mong" typeface="Mongolian Baiti"/>
+        <a:font script="Viet" typeface="Times New Roman"/>
+        <a:font script="Uigh" typeface="Microsoft Uighur"/>
+        <a:font script="Geor" typeface="Sylfaen"/>
+      </a:majorFont>
+      <a:minorFont>
+        <a:latin typeface="Calibri"/>
+        <a:ea typeface=""/>
+        <a:cs typeface=""/>
+        <a:font script="Jpan" typeface="ＭＳ Ｐゴシック"/>
+        <a:font script="Hang" typeface="맑은 고딕"/>
+        <a:font script="Hans" typeface="宋体"/>
+        <a:font script="Hant" typeface="新細明體"/>
+        <a:font script="Arab" typeface="Arial"/>
+        <a:font script="Hebr" typeface="Arial"/>
+        <a:font script="Thai" typeface="Cordia New"/>
+        <a:font script="Ethi" typeface="Nyala"/>
+        <a:font script="Beng" typeface="Vrinda"/>
+        <a:font script="Gujr" typeface="Shruti"/>
+        <a:font script="Khmr" typeface="DaunPenh"/>
+        <a:font script="Knda" typeface="Tunga"/>
+        <a:font script="Guru" typeface="Raavi"/>
+        <a:font script="Cans" typeface="Euphemia"/>
+        <a:font script="Cher" typeface="Plantagenet Cherokee"/>
+        <a:font script="Yiii" typeface="Microsoft Yi Baiti"/>
+        <a:font script="Tibt" typeface="Microsoft Himalaya"/>
+        <a:font script="Thaa" typeface="MV Boli"/>
+        <a:font script="Deva" typeface="Mangal"/>
+        <a:font script="Telu" typeface="Gautami"/>
+        <a:font script="Taml" typeface="Latha"/>
+        <a:font script="Syrc" typeface="Estrangelo Edessa"/>
+        <a:font script="Orya" typeface="Kalinga"/>
+        <a:font script="Mlym" typeface="Kartika"/>
+        <a:font script="Laoo" typeface="DokChampa"/>
+        <a:font script="Sinh" typeface="Iskoola Pota"/>
+        <a:font script="Mong" typeface="Mongolian Baiti"/>
+        <a:font script="Viet" typeface="Arial"/>
+        <a:font script="Uigh" typeface="Microsoft Uighur"/>
+        <a:font script="Geor" typeface="Sylfaen"/>
+      </a:minorFont>
+    </a:fontScheme>
+    <a:fmtScheme name="Office">
+      <a:fillStyleLst>
+        <a:solidFill>
+          <a:schemeClr val="phClr"/>
+        </a:solidFill>
+        <a:gradFill rotWithShape="1">
+          <a:gsLst>
+            <a:gs pos="0">
+              <a:schemeClr val="phClr">
+                <a:tint val="50000"/>
+                <a:satMod val="300000"/>
+              </a:schemeClr>
+            </a:gs>
+            <a:gs pos="35000">
+              <a:schemeClr val="phClr">
+                <a:tint val="37000"/>
+                <a:satMod val="300000"/>
+              </a:schemeClr>
+            </a:gs>
+            <a:gs pos="100000">
+              <a:schemeClr val="phClr">
+                <a:tint val="15000"/>
+                <a:satMod val="350000"/>
+              </a:schemeClr>
+            </a:gs>
+          </a:gsLst>
+          <a:lin ang="16200000" scaled="1"/>
+        </a:gradFill>
+        <a:gradFill rotWithShape="1">
+          <a:gsLst>
+            <a:gs pos="0">
+              <a:schemeClr val="phClr">
+                <a:shade val="51000"/>
+                <a:satMod val="130000"/>
+              </a:schemeClr>
+            </a:gs>
+            <a:gs pos="80000">
+              <a:schemeClr val="phClr">
+                <a:shade val="93000"/>
+                <a:satMod val="130000"/>
+              </a:schemeClr>
+            </a:gs>
+            <a:gs pos="100000">
+              <a:schemeClr val="phClr">
+                <a:shade val="94000"/>
+                <a:satMod val="135000"/>
+              </a:schemeClr>
+            </a:gs>
+          </a:gsLst>
+          <a:lin ang="16200000" scaled="0"/>
+        </a:gradFill>
+      </a:fillStyleLst>
+      <a:lnStyleLst>
+        <a:ln w="9525" cap="flat" cmpd="sng" algn="ctr">
+          <a:solidFill>
+            <a:schemeClr val="phClr">
+              <a:shade val="95000"/>
+              <a:satMod val="105000"/>
+            </a:schemeClr>
+          </a:solidFill>
+          <a:prstDash val="solid"/>
+        </a:ln>
+        <a:ln w="25400" cap="flat" cmpd="sng" algn="ctr">
+          <a:solidFill>
+            <a:schemeClr val="phClr"/>
+          </a:solidFill>
+          <a:prstDash val="solid"/>
+        </a:ln>
+        <a:ln w="38100" cap="flat" cmpd="sng" algn="ctr">
+          <a:solidFill>
+            <a:schemeClr val="phClr"/>
+          </a:solidFill>
+          <a:prstDash val="solid"/>
+        </a:ln>
+      </a:lnStyleLst>
+      <a:effectStyleLst>
+        <a:effectStyle>
+          <a:effectLst>
+            <a:outerShdw blurRad="40000" dist="20000" dir="5400000" rotWithShape="0">
+              <a:srgbClr val="000000">
+                <a:alpha val="38000"/>
+              </a:srgbClr>
+            </a:outerShdw>
+          </a:effectLst>
+        </a:effectStyle>
+        <a:effectStyle>
+          <a:effectLst>
+            <a:outerShdw blurRad="40000" dist="23000" dir="5400000" rotWithShape="0">
+              <a:srgbClr val="000000">
+                <a:alpha val="35000"/>
+              </a:srgbClr>
+            </a:outerShdw>
+          </a:effectLst>
+        </a:effectStyle>
+        <a:effectStyle>
+          <a:effectLst>
+            <a:outerShdw blurRad="40000" dist="23000" dir="5400000" rotWithShape="0">
+              <a:srgbClr val="000000">
+                <a:alpha val="35000"/>
+              </a:srgbClr>
+            </a:outerShdw>
+          </a:effectLst>
+          <a:scene3d>
+            <a:camera prst="orthographicFront">
+              <a:rot lat="0" lon="0" rev="0"/>
+            </a:camera>
+            <a:lightRig rig="threePt" dir="t">
+              <a:rot lat="0" lon="0" rev="1200000"/>
+            </a:lightRig>
+          </a:scene3d>
+          <a:sp3d>
+            <a:bevelT w="63500" h="25400"/>
+          </a:sp3d>
+        </a:effectStyle>
+      </a:effectStyleLst>
+      <a:bgFillStyleLst>
+        <a:solidFill>
+          <a:schemeClr val="phClr"/>
+        </a:solidFill>
+        <a:gradFill rotWithShape="1">
+          <a:gsLst>
+            <a:gs pos="0">
+              <a:schemeClr val="phClr">
+                <a:tint val="40000"/>
+                <a:satMod val="350000"/>
+              </a:schemeClr>
+            </a:gs>
+            <a:gs pos="40000">
+              <a:schemeClr val="phClr">
+                <a:tint val="45000"/>
+                <a:shade val="99000"/>
+                <a:satMod val="350000"/>
+              </a:schemeClr>
+            </a:gs>
+            <a:gs pos="100000">
+              <a:schemeClr val="phClr">
+                <a:shade val="20000"/>
+                <a:satMod val="255000"/>
+              </a:schemeClr>
+            </a:gs>
+          </a:gsLst>
+          <a:path path="circle">
+            <a:fillToRect l="50000" t="-80000" r="50000" b="180000"/>
+          </a:path>
+        </a:gradFill>
+        <a:gradFill rotWithShape="1">
+          <a:gsLst>
+            <a:gs pos="0">
+              <a:schemeClr val="phClr">
+                <a:tint val="80000"/>
+                <a:satMod val="300000"/>
+              </a:schemeClr>
+            </a:gs>
+            <a:gs pos="100000">
+              <a:schemeClr val="phClr">
+                <a:shade val="30000"/>
+                <a:satMod val="200000"/>
+              </a:schemeClr>
+            </a:gs>
+          </a:gsLst>
+          <a:path path="circle">
+            <a:fillToRect l="50000" t="50000" r="50000" b="50000"/>
+          </a:path>
+        </a:gradFill>
+      </a:bgFillStyleLst>
+    </a:fmtScheme>
+  </a:themeElements>
+  <a:objectDefaults/>
+  <a:extraClrSchemeLst/>
+</a:theme>
 </file>
</xml_diff>